<commit_message>
Finished PowerPoint and changed all of the incorrect models in the paper
</commit_message>
<xml_diff>
--- a/Presentation/795 PowerPoint.pptx
+++ b/Presentation/795 PowerPoint.pptx
@@ -5,7 +5,7 @@
     <p:sldMasterId id="2147483648" r:id="rId1"/>
   </p:sldMasterIdLst>
   <p:notesMasterIdLst>
-    <p:notesMasterId r:id="rId11"/>
+    <p:notesMasterId r:id="rId17"/>
   </p:notesMasterIdLst>
   <p:sldIdLst>
     <p:sldId id="256" r:id="rId2"/>
@@ -17,6 +17,12 @@
     <p:sldId id="281" r:id="rId8"/>
     <p:sldId id="282" r:id="rId9"/>
     <p:sldId id="261" r:id="rId10"/>
+    <p:sldId id="283" r:id="rId11"/>
+    <p:sldId id="284" r:id="rId12"/>
+    <p:sldId id="285" r:id="rId13"/>
+    <p:sldId id="286" r:id="rId14"/>
+    <p:sldId id="287" r:id="rId15"/>
+    <p:sldId id="288" r:id="rId16"/>
   </p:sldIdLst>
   <p:sldSz cx="4610100" cy="3460750"/>
   <p:notesSz cx="4610100" cy="3460750"/>
@@ -2418,6 +2424,1653 @@
         </p:txBody>
       </p:sp>
     </p:spTree>
+  </p:cSld>
+  <p:clrMapOvr>
+    <a:masterClrMapping/>
+  </p:clrMapOvr>
+  <p:transition>
+    <p:cut/>
+  </p:transition>
+</p:sld>
+</file>
+
+<file path=ppt/slides/slide10.xml><?xml version="1.0" encoding="utf-8"?>
+<p:sld xmlns:a="http://schemas.openxmlformats.org/drawingml/2006/main" xmlns:r="http://schemas.openxmlformats.org/officeDocument/2006/relationships" xmlns:p="http://schemas.openxmlformats.org/presentationml/2006/main">
+  <p:cSld>
+    <p:spTree>
+      <p:nvGrpSpPr>
+        <p:cNvPr id="1" name=""/>
+        <p:cNvGrpSpPr/>
+        <p:nvPr/>
+      </p:nvGrpSpPr>
+      <p:grpSpPr>
+        <a:xfrm>
+          <a:off x="0" y="0"/>
+          <a:ext cx="0" cy="0"/>
+          <a:chOff x="0" y="0"/>
+          <a:chExt cx="0" cy="0"/>
+        </a:xfrm>
+      </p:grpSpPr>
+      <p:sp>
+        <p:nvSpPr>
+          <p:cNvPr id="2" name="object 2"/>
+          <p:cNvSpPr txBox="1">
+            <a:spLocks noGrp="1"/>
+          </p:cNvSpPr>
+          <p:nvPr>
+            <p:ph type="title"/>
+          </p:nvPr>
+        </p:nvSpPr>
+        <p:spPr>
+          <a:xfrm>
+            <a:off x="275296" y="121180"/>
+            <a:ext cx="1877354" cy="232756"/>
+          </a:xfrm>
+          <a:prstGeom prst="rect">
+            <a:avLst/>
+          </a:prstGeom>
+        </p:spPr>
+        <p:txBody>
+          <a:bodyPr vert="horz" wrap="square" lIns="0" tIns="17145" rIns="0" bIns="0" rtlCol="0">
+            <a:spAutoFit/>
+          </a:bodyPr>
+          <a:lstStyle/>
+          <a:p>
+            <a:pPr marL="12700">
+              <a:lnSpc>
+                <a:spcPct val="100000"/>
+              </a:lnSpc>
+              <a:spcBef>
+                <a:spcPts val="135"/>
+              </a:spcBef>
+            </a:pPr>
+            <a:r>
+              <a:rPr lang="en-US" spc="-15" dirty="0"/>
+              <a:t>EDA</a:t>
+            </a:r>
+            <a:endParaRPr spc="-15" dirty="0"/>
+          </a:p>
+        </p:txBody>
+      </p:sp>
+      <p:sp>
+        <p:nvSpPr>
+          <p:cNvPr id="6" name="object 6"/>
+          <p:cNvSpPr txBox="1">
+            <a:spLocks noGrp="1"/>
+          </p:cNvSpPr>
+          <p:nvPr>
+            <p:ph type="ftr" sz="quarter" idx="5"/>
+          </p:nvPr>
+        </p:nvSpPr>
+        <p:spPr>
+          <a:xfrm>
+            <a:off x="1716874" y="3204555"/>
+            <a:ext cx="978535" cy="114134"/>
+          </a:xfrm>
+          <a:prstGeom prst="rect">
+            <a:avLst/>
+          </a:prstGeom>
+        </p:spPr>
+        <p:txBody>
+          <a:bodyPr vert="horz" wrap="square" lIns="0" tIns="21590" rIns="0" bIns="0" rtlCol="0">
+            <a:spAutoFit/>
+          </a:bodyPr>
+          <a:lstStyle/>
+          <a:p>
+            <a:pPr marL="12700">
+              <a:lnSpc>
+                <a:spcPct val="100000"/>
+              </a:lnSpc>
+              <a:spcBef>
+                <a:spcPts val="170"/>
+              </a:spcBef>
+            </a:pPr>
+            <a:r>
+              <a:rPr spc="80" dirty="0"/>
+              <a:t>Stat </a:t>
+            </a:r>
+            <a:r>
+              <a:rPr lang="en-US" spc="65" dirty="0"/>
+              <a:t>795</a:t>
+            </a:r>
+            <a:r>
+              <a:rPr spc="55" dirty="0"/>
+              <a:t> Presentation</a:t>
+            </a:r>
+          </a:p>
+        </p:txBody>
+      </p:sp>
+      <p:sp>
+        <p:nvSpPr>
+          <p:cNvPr id="7" name="object 7"/>
+          <p:cNvSpPr txBox="1">
+            <a:spLocks noGrp="1"/>
+          </p:cNvSpPr>
+          <p:nvPr>
+            <p:ph type="sldNum" sz="quarter" idx="7"/>
+          </p:nvPr>
+        </p:nvSpPr>
+        <p:spPr>
+          <a:prstGeom prst="rect">
+            <a:avLst/>
+          </a:prstGeom>
+        </p:spPr>
+        <p:txBody>
+          <a:bodyPr vert="horz" wrap="square" lIns="0" tIns="18415" rIns="0" bIns="0" rtlCol="0">
+            <a:spAutoFit/>
+          </a:bodyPr>
+          <a:lstStyle/>
+          <a:p>
+            <a:pPr marL="25400">
+              <a:lnSpc>
+                <a:spcPct val="100000"/>
+              </a:lnSpc>
+              <a:spcBef>
+                <a:spcPts val="145"/>
+              </a:spcBef>
+            </a:pPr>
+            <a:fld id="{81D60167-4931-47E6-BA6A-407CBD079E47}" type="slidenum">
+              <a:rPr spc="20" dirty="0"/>
+              <a:t>10</a:t>
+            </a:fld>
+            <a:r>
+              <a:rPr spc="20" dirty="0"/>
+              <a:t>/15</a:t>
+            </a:r>
+          </a:p>
+        </p:txBody>
+      </p:sp>
+      <p:pic>
+        <p:nvPicPr>
+          <p:cNvPr id="13" name="Picture 12">
+            <a:extLst>
+              <a:ext uri="{FF2B5EF4-FFF2-40B4-BE49-F238E27FC236}">
+                <a16:creationId xmlns:a16="http://schemas.microsoft.com/office/drawing/2014/main" id="{864F5AC7-498B-1E45-8783-749EAA820851}"/>
+              </a:ext>
+            </a:extLst>
+          </p:cNvPr>
+          <p:cNvPicPr>
+            <a:picLocks noChangeAspect="1"/>
+          </p:cNvPicPr>
+          <p:nvPr/>
+        </p:nvPicPr>
+        <p:blipFill>
+          <a:blip r:embed="rId2">
+            <a:extLst>
+              <a:ext uri="{28A0092B-C50C-407E-A947-70E740481C1C}">
+                <a14:useLocalDpi xmlns:a14="http://schemas.microsoft.com/office/drawing/2010/main" val="0"/>
+              </a:ext>
+            </a:extLst>
+          </a:blip>
+          <a:stretch>
+            <a:fillRect/>
+          </a:stretch>
+        </p:blipFill>
+        <p:spPr>
+          <a:xfrm>
+            <a:off x="149403" y="349373"/>
+            <a:ext cx="4222381" cy="2684944"/>
+          </a:xfrm>
+          <a:prstGeom prst="rect">
+            <a:avLst/>
+          </a:prstGeom>
+        </p:spPr>
+      </p:pic>
+    </p:spTree>
+    <p:extLst>
+      <p:ext uri="{BB962C8B-B14F-4D97-AF65-F5344CB8AC3E}">
+        <p14:creationId xmlns:p14="http://schemas.microsoft.com/office/powerpoint/2010/main" val="1464774213"/>
+      </p:ext>
+    </p:extLst>
+  </p:cSld>
+  <p:clrMapOvr>
+    <a:masterClrMapping/>
+  </p:clrMapOvr>
+  <p:transition>
+    <p:cut/>
+  </p:transition>
+</p:sld>
+</file>
+
+<file path=ppt/slides/slide11.xml><?xml version="1.0" encoding="utf-8"?>
+<p:sld xmlns:a="http://schemas.openxmlformats.org/drawingml/2006/main" xmlns:r="http://schemas.openxmlformats.org/officeDocument/2006/relationships" xmlns:p="http://schemas.openxmlformats.org/presentationml/2006/main">
+  <p:cSld>
+    <p:spTree>
+      <p:nvGrpSpPr>
+        <p:cNvPr id="1" name=""/>
+        <p:cNvGrpSpPr/>
+        <p:nvPr/>
+      </p:nvGrpSpPr>
+      <p:grpSpPr>
+        <a:xfrm>
+          <a:off x="0" y="0"/>
+          <a:ext cx="0" cy="0"/>
+          <a:chOff x="0" y="0"/>
+          <a:chExt cx="0" cy="0"/>
+        </a:xfrm>
+      </p:grpSpPr>
+      <p:sp>
+        <p:nvSpPr>
+          <p:cNvPr id="2" name="object 2"/>
+          <p:cNvSpPr txBox="1">
+            <a:spLocks noGrp="1"/>
+          </p:cNvSpPr>
+          <p:nvPr>
+            <p:ph type="title"/>
+          </p:nvPr>
+        </p:nvSpPr>
+        <p:spPr>
+          <a:xfrm>
+            <a:off x="275296" y="121180"/>
+            <a:ext cx="1877354" cy="232756"/>
+          </a:xfrm>
+          <a:prstGeom prst="rect">
+            <a:avLst/>
+          </a:prstGeom>
+        </p:spPr>
+        <p:txBody>
+          <a:bodyPr vert="horz" wrap="square" lIns="0" tIns="17145" rIns="0" bIns="0" rtlCol="0">
+            <a:spAutoFit/>
+          </a:bodyPr>
+          <a:lstStyle/>
+          <a:p>
+            <a:pPr marL="12700">
+              <a:lnSpc>
+                <a:spcPct val="100000"/>
+              </a:lnSpc>
+              <a:spcBef>
+                <a:spcPts val="135"/>
+              </a:spcBef>
+            </a:pPr>
+            <a:r>
+              <a:rPr lang="en-US" spc="-15" dirty="0"/>
+              <a:t>EDA</a:t>
+            </a:r>
+            <a:endParaRPr spc="-15" dirty="0"/>
+          </a:p>
+        </p:txBody>
+      </p:sp>
+      <p:sp>
+        <p:nvSpPr>
+          <p:cNvPr id="6" name="object 6"/>
+          <p:cNvSpPr txBox="1">
+            <a:spLocks noGrp="1"/>
+          </p:cNvSpPr>
+          <p:nvPr>
+            <p:ph type="ftr" sz="quarter" idx="5"/>
+          </p:nvPr>
+        </p:nvSpPr>
+        <p:spPr>
+          <a:xfrm>
+            <a:off x="1716874" y="3204555"/>
+            <a:ext cx="978535" cy="114134"/>
+          </a:xfrm>
+          <a:prstGeom prst="rect">
+            <a:avLst/>
+          </a:prstGeom>
+        </p:spPr>
+        <p:txBody>
+          <a:bodyPr vert="horz" wrap="square" lIns="0" tIns="21590" rIns="0" bIns="0" rtlCol="0">
+            <a:spAutoFit/>
+          </a:bodyPr>
+          <a:lstStyle/>
+          <a:p>
+            <a:pPr marL="12700">
+              <a:lnSpc>
+                <a:spcPct val="100000"/>
+              </a:lnSpc>
+              <a:spcBef>
+                <a:spcPts val="170"/>
+              </a:spcBef>
+            </a:pPr>
+            <a:r>
+              <a:rPr spc="80" dirty="0"/>
+              <a:t>Stat </a:t>
+            </a:r>
+            <a:r>
+              <a:rPr lang="en-US" spc="65" dirty="0"/>
+              <a:t>795</a:t>
+            </a:r>
+            <a:r>
+              <a:rPr spc="55" dirty="0"/>
+              <a:t> Presentation</a:t>
+            </a:r>
+          </a:p>
+        </p:txBody>
+      </p:sp>
+      <p:sp>
+        <p:nvSpPr>
+          <p:cNvPr id="7" name="object 7"/>
+          <p:cNvSpPr txBox="1">
+            <a:spLocks noGrp="1"/>
+          </p:cNvSpPr>
+          <p:nvPr>
+            <p:ph type="sldNum" sz="quarter" idx="7"/>
+          </p:nvPr>
+        </p:nvSpPr>
+        <p:spPr>
+          <a:prstGeom prst="rect">
+            <a:avLst/>
+          </a:prstGeom>
+        </p:spPr>
+        <p:txBody>
+          <a:bodyPr vert="horz" wrap="square" lIns="0" tIns="18415" rIns="0" bIns="0" rtlCol="0">
+            <a:spAutoFit/>
+          </a:bodyPr>
+          <a:lstStyle/>
+          <a:p>
+            <a:pPr marL="25400">
+              <a:lnSpc>
+                <a:spcPct val="100000"/>
+              </a:lnSpc>
+              <a:spcBef>
+                <a:spcPts val="145"/>
+              </a:spcBef>
+            </a:pPr>
+            <a:fld id="{81D60167-4931-47E6-BA6A-407CBD079E47}" type="slidenum">
+              <a:rPr spc="20" dirty="0"/>
+              <a:t>11</a:t>
+            </a:fld>
+            <a:r>
+              <a:rPr spc="20" dirty="0"/>
+              <a:t>/15</a:t>
+            </a:r>
+          </a:p>
+        </p:txBody>
+      </p:sp>
+      <p:pic>
+        <p:nvPicPr>
+          <p:cNvPr id="3" name="Picture 2">
+            <a:extLst>
+              <a:ext uri="{FF2B5EF4-FFF2-40B4-BE49-F238E27FC236}">
+                <a16:creationId xmlns:a16="http://schemas.microsoft.com/office/drawing/2014/main" id="{BD335D46-01C8-8F43-A1B5-38231B13F1C7}"/>
+              </a:ext>
+            </a:extLst>
+          </p:cNvPr>
+          <p:cNvPicPr>
+            <a:picLocks noChangeAspect="1"/>
+          </p:cNvPicPr>
+          <p:nvPr/>
+        </p:nvPicPr>
+        <p:blipFill>
+          <a:blip r:embed="rId2"/>
+          <a:stretch>
+            <a:fillRect/>
+          </a:stretch>
+        </p:blipFill>
+        <p:spPr>
+          <a:xfrm>
+            <a:off x="24916" y="443296"/>
+            <a:ext cx="4362450" cy="2774011"/>
+          </a:xfrm>
+          <a:prstGeom prst="rect">
+            <a:avLst/>
+          </a:prstGeom>
+        </p:spPr>
+      </p:pic>
+    </p:spTree>
+    <p:extLst>
+      <p:ext uri="{BB962C8B-B14F-4D97-AF65-F5344CB8AC3E}">
+        <p14:creationId xmlns:p14="http://schemas.microsoft.com/office/powerpoint/2010/main" val="910923941"/>
+      </p:ext>
+    </p:extLst>
+  </p:cSld>
+  <p:clrMapOvr>
+    <a:masterClrMapping/>
+  </p:clrMapOvr>
+  <p:transition>
+    <p:cut/>
+  </p:transition>
+</p:sld>
+</file>
+
+<file path=ppt/slides/slide12.xml><?xml version="1.0" encoding="utf-8"?>
+<p:sld xmlns:a="http://schemas.openxmlformats.org/drawingml/2006/main" xmlns:r="http://schemas.openxmlformats.org/officeDocument/2006/relationships" xmlns:p="http://schemas.openxmlformats.org/presentationml/2006/main">
+  <p:cSld>
+    <p:spTree>
+      <p:nvGrpSpPr>
+        <p:cNvPr id="1" name=""/>
+        <p:cNvGrpSpPr/>
+        <p:nvPr/>
+      </p:nvGrpSpPr>
+      <p:grpSpPr>
+        <a:xfrm>
+          <a:off x="0" y="0"/>
+          <a:ext cx="0" cy="0"/>
+          <a:chOff x="0" y="0"/>
+          <a:chExt cx="0" cy="0"/>
+        </a:xfrm>
+      </p:grpSpPr>
+      <p:sp>
+        <p:nvSpPr>
+          <p:cNvPr id="2" name="object 2"/>
+          <p:cNvSpPr txBox="1">
+            <a:spLocks noGrp="1"/>
+          </p:cNvSpPr>
+          <p:nvPr>
+            <p:ph type="title"/>
+          </p:nvPr>
+        </p:nvSpPr>
+        <p:spPr>
+          <a:xfrm>
+            <a:off x="275296" y="121180"/>
+            <a:ext cx="1877354" cy="232756"/>
+          </a:xfrm>
+          <a:prstGeom prst="rect">
+            <a:avLst/>
+          </a:prstGeom>
+        </p:spPr>
+        <p:txBody>
+          <a:bodyPr vert="horz" wrap="square" lIns="0" tIns="17145" rIns="0" bIns="0" rtlCol="0">
+            <a:spAutoFit/>
+          </a:bodyPr>
+          <a:lstStyle/>
+          <a:p>
+            <a:pPr marL="12700">
+              <a:lnSpc>
+                <a:spcPct val="100000"/>
+              </a:lnSpc>
+              <a:spcBef>
+                <a:spcPts val="135"/>
+              </a:spcBef>
+            </a:pPr>
+            <a:r>
+              <a:rPr lang="en-US" spc="-15" dirty="0"/>
+              <a:t>ANCOVA Model</a:t>
+            </a:r>
+            <a:endParaRPr spc="-15" dirty="0"/>
+          </a:p>
+        </p:txBody>
+      </p:sp>
+      <p:sp>
+        <p:nvSpPr>
+          <p:cNvPr id="6" name="object 6"/>
+          <p:cNvSpPr txBox="1">
+            <a:spLocks noGrp="1"/>
+          </p:cNvSpPr>
+          <p:nvPr>
+            <p:ph type="ftr" sz="quarter" idx="5"/>
+          </p:nvPr>
+        </p:nvSpPr>
+        <p:spPr>
+          <a:xfrm>
+            <a:off x="1716874" y="3204555"/>
+            <a:ext cx="978535" cy="114134"/>
+          </a:xfrm>
+          <a:prstGeom prst="rect">
+            <a:avLst/>
+          </a:prstGeom>
+        </p:spPr>
+        <p:txBody>
+          <a:bodyPr vert="horz" wrap="square" lIns="0" tIns="21590" rIns="0" bIns="0" rtlCol="0">
+            <a:spAutoFit/>
+          </a:bodyPr>
+          <a:lstStyle/>
+          <a:p>
+            <a:pPr marL="12700">
+              <a:lnSpc>
+                <a:spcPct val="100000"/>
+              </a:lnSpc>
+              <a:spcBef>
+                <a:spcPts val="170"/>
+              </a:spcBef>
+            </a:pPr>
+            <a:r>
+              <a:rPr spc="80" dirty="0"/>
+              <a:t>Stat </a:t>
+            </a:r>
+            <a:r>
+              <a:rPr lang="en-US" spc="65" dirty="0"/>
+              <a:t>795</a:t>
+            </a:r>
+            <a:r>
+              <a:rPr spc="55" dirty="0"/>
+              <a:t> Presentation</a:t>
+            </a:r>
+          </a:p>
+        </p:txBody>
+      </p:sp>
+      <p:sp>
+        <p:nvSpPr>
+          <p:cNvPr id="7" name="object 7"/>
+          <p:cNvSpPr txBox="1">
+            <a:spLocks noGrp="1"/>
+          </p:cNvSpPr>
+          <p:nvPr>
+            <p:ph type="sldNum" sz="quarter" idx="7"/>
+          </p:nvPr>
+        </p:nvSpPr>
+        <p:spPr>
+          <a:prstGeom prst="rect">
+            <a:avLst/>
+          </a:prstGeom>
+        </p:spPr>
+        <p:txBody>
+          <a:bodyPr vert="horz" wrap="square" lIns="0" tIns="18415" rIns="0" bIns="0" rtlCol="0">
+            <a:spAutoFit/>
+          </a:bodyPr>
+          <a:lstStyle/>
+          <a:p>
+            <a:pPr marL="25400">
+              <a:lnSpc>
+                <a:spcPct val="100000"/>
+              </a:lnSpc>
+              <a:spcBef>
+                <a:spcPts val="145"/>
+              </a:spcBef>
+            </a:pPr>
+            <a:fld id="{81D60167-4931-47E6-BA6A-407CBD079E47}" type="slidenum">
+              <a:rPr spc="20" dirty="0"/>
+              <a:t>12</a:t>
+            </a:fld>
+            <a:r>
+              <a:rPr spc="20" dirty="0"/>
+              <a:t>/15</a:t>
+            </a:r>
+          </a:p>
+        </p:txBody>
+      </p:sp>
+      <p:pic>
+        <p:nvPicPr>
+          <p:cNvPr id="10" name="Picture 9">
+            <a:extLst>
+              <a:ext uri="{FF2B5EF4-FFF2-40B4-BE49-F238E27FC236}">
+                <a16:creationId xmlns:a16="http://schemas.microsoft.com/office/drawing/2014/main" id="{0A2F20D7-4631-F042-93B7-4290C3498BA8}"/>
+              </a:ext>
+            </a:extLst>
+          </p:cNvPr>
+          <p:cNvPicPr>
+            <a:picLocks noChangeAspect="1"/>
+          </p:cNvPicPr>
+          <p:nvPr/>
+        </p:nvPicPr>
+        <p:blipFill>
+          <a:blip r:embed="rId2"/>
+          <a:stretch>
+            <a:fillRect/>
+          </a:stretch>
+        </p:blipFill>
+        <p:spPr>
+          <a:xfrm>
+            <a:off x="0" y="968375"/>
+            <a:ext cx="4610100" cy="1794772"/>
+          </a:xfrm>
+          <a:prstGeom prst="rect">
+            <a:avLst/>
+          </a:prstGeom>
+        </p:spPr>
+      </p:pic>
+      <p:sp>
+        <p:nvSpPr>
+          <p:cNvPr id="11" name="object 2">
+            <a:extLst>
+              <a:ext uri="{FF2B5EF4-FFF2-40B4-BE49-F238E27FC236}">
+                <a16:creationId xmlns:a16="http://schemas.microsoft.com/office/drawing/2014/main" id="{754A14FF-0DE7-7D4F-8789-DF0D81A91E92}"/>
+              </a:ext>
+            </a:extLst>
+          </p:cNvPr>
+          <p:cNvSpPr txBox="1">
+            <a:spLocks/>
+          </p:cNvSpPr>
+          <p:nvPr/>
+        </p:nvSpPr>
+        <p:spPr>
+          <a:xfrm>
+            <a:off x="275296" y="464421"/>
+            <a:ext cx="2486954" cy="232756"/>
+          </a:xfrm>
+          <a:prstGeom prst="rect">
+            <a:avLst/>
+          </a:prstGeom>
+        </p:spPr>
+        <p:txBody>
+          <a:bodyPr vert="horz" wrap="square" lIns="0" tIns="17145" rIns="0" bIns="0" rtlCol="0">
+            <a:spAutoFit/>
+          </a:bodyPr>
+          <a:lstStyle>
+            <a:lvl1pPr>
+              <a:defRPr sz="1400" b="0" i="0">
+                <a:solidFill>
+                  <a:srgbClr val="58180C"/>
+                </a:solidFill>
+                <a:latin typeface="Palatino Linotype"/>
+                <a:ea typeface="+mj-ea"/>
+                <a:cs typeface="Palatino Linotype"/>
+              </a:defRPr>
+            </a:lvl1pPr>
+          </a:lstStyle>
+          <a:p>
+            <a:pPr marL="12700">
+              <a:spcBef>
+                <a:spcPts val="135"/>
+              </a:spcBef>
+            </a:pPr>
+            <a:r>
+              <a:rPr lang="en-US" kern="0" spc="-15" dirty="0"/>
+              <a:t>Type III SS for Carry Distance</a:t>
+            </a:r>
+          </a:p>
+        </p:txBody>
+      </p:sp>
+    </p:spTree>
+    <p:extLst>
+      <p:ext uri="{BB962C8B-B14F-4D97-AF65-F5344CB8AC3E}">
+        <p14:creationId xmlns:p14="http://schemas.microsoft.com/office/powerpoint/2010/main" val="2941610143"/>
+      </p:ext>
+    </p:extLst>
+  </p:cSld>
+  <p:clrMapOvr>
+    <a:masterClrMapping/>
+  </p:clrMapOvr>
+  <p:transition>
+    <p:cut/>
+  </p:transition>
+</p:sld>
+</file>
+
+<file path=ppt/slides/slide13.xml><?xml version="1.0" encoding="utf-8"?>
+<p:sld xmlns:a="http://schemas.openxmlformats.org/drawingml/2006/main" xmlns:r="http://schemas.openxmlformats.org/officeDocument/2006/relationships" xmlns:p="http://schemas.openxmlformats.org/presentationml/2006/main">
+  <p:cSld>
+    <p:spTree>
+      <p:nvGrpSpPr>
+        <p:cNvPr id="1" name=""/>
+        <p:cNvGrpSpPr/>
+        <p:nvPr/>
+      </p:nvGrpSpPr>
+      <p:grpSpPr>
+        <a:xfrm>
+          <a:off x="0" y="0"/>
+          <a:ext cx="0" cy="0"/>
+          <a:chOff x="0" y="0"/>
+          <a:chExt cx="0" cy="0"/>
+        </a:xfrm>
+      </p:grpSpPr>
+      <p:sp>
+        <p:nvSpPr>
+          <p:cNvPr id="2" name="object 2"/>
+          <p:cNvSpPr txBox="1">
+            <a:spLocks noGrp="1"/>
+          </p:cNvSpPr>
+          <p:nvPr>
+            <p:ph type="title"/>
+          </p:nvPr>
+        </p:nvSpPr>
+        <p:spPr>
+          <a:xfrm>
+            <a:off x="275296" y="121180"/>
+            <a:ext cx="1877354" cy="232756"/>
+          </a:xfrm>
+          <a:prstGeom prst="rect">
+            <a:avLst/>
+          </a:prstGeom>
+        </p:spPr>
+        <p:txBody>
+          <a:bodyPr vert="horz" wrap="square" lIns="0" tIns="17145" rIns="0" bIns="0" rtlCol="0">
+            <a:spAutoFit/>
+          </a:bodyPr>
+          <a:lstStyle/>
+          <a:p>
+            <a:pPr marL="12700">
+              <a:lnSpc>
+                <a:spcPct val="100000"/>
+              </a:lnSpc>
+              <a:spcBef>
+                <a:spcPts val="135"/>
+              </a:spcBef>
+            </a:pPr>
+            <a:r>
+              <a:rPr lang="en-US" spc="-15" dirty="0"/>
+              <a:t>ANCOVA Diagnostics</a:t>
+            </a:r>
+            <a:endParaRPr spc="-15" dirty="0"/>
+          </a:p>
+        </p:txBody>
+      </p:sp>
+      <p:sp>
+        <p:nvSpPr>
+          <p:cNvPr id="6" name="object 6"/>
+          <p:cNvSpPr txBox="1">
+            <a:spLocks noGrp="1"/>
+          </p:cNvSpPr>
+          <p:nvPr>
+            <p:ph type="ftr" sz="quarter" idx="5"/>
+          </p:nvPr>
+        </p:nvSpPr>
+        <p:spPr>
+          <a:xfrm>
+            <a:off x="1716874" y="3204555"/>
+            <a:ext cx="978535" cy="114134"/>
+          </a:xfrm>
+          <a:prstGeom prst="rect">
+            <a:avLst/>
+          </a:prstGeom>
+        </p:spPr>
+        <p:txBody>
+          <a:bodyPr vert="horz" wrap="square" lIns="0" tIns="21590" rIns="0" bIns="0" rtlCol="0">
+            <a:spAutoFit/>
+          </a:bodyPr>
+          <a:lstStyle/>
+          <a:p>
+            <a:pPr marL="12700">
+              <a:lnSpc>
+                <a:spcPct val="100000"/>
+              </a:lnSpc>
+              <a:spcBef>
+                <a:spcPts val="170"/>
+              </a:spcBef>
+            </a:pPr>
+            <a:r>
+              <a:rPr spc="80" dirty="0"/>
+              <a:t>Stat </a:t>
+            </a:r>
+            <a:r>
+              <a:rPr lang="en-US" spc="65" dirty="0"/>
+              <a:t>795</a:t>
+            </a:r>
+            <a:r>
+              <a:rPr spc="55" dirty="0"/>
+              <a:t> Presentation</a:t>
+            </a:r>
+          </a:p>
+        </p:txBody>
+      </p:sp>
+      <p:sp>
+        <p:nvSpPr>
+          <p:cNvPr id="7" name="object 7"/>
+          <p:cNvSpPr txBox="1">
+            <a:spLocks noGrp="1"/>
+          </p:cNvSpPr>
+          <p:nvPr>
+            <p:ph type="sldNum" sz="quarter" idx="7"/>
+          </p:nvPr>
+        </p:nvSpPr>
+        <p:spPr>
+          <a:prstGeom prst="rect">
+            <a:avLst/>
+          </a:prstGeom>
+        </p:spPr>
+        <p:txBody>
+          <a:bodyPr vert="horz" wrap="square" lIns="0" tIns="18415" rIns="0" bIns="0" rtlCol="0">
+            <a:spAutoFit/>
+          </a:bodyPr>
+          <a:lstStyle/>
+          <a:p>
+            <a:pPr marL="25400">
+              <a:lnSpc>
+                <a:spcPct val="100000"/>
+              </a:lnSpc>
+              <a:spcBef>
+                <a:spcPts val="145"/>
+              </a:spcBef>
+            </a:pPr>
+            <a:fld id="{81D60167-4931-47E6-BA6A-407CBD079E47}" type="slidenum">
+              <a:rPr spc="20" dirty="0"/>
+              <a:t>13</a:t>
+            </a:fld>
+            <a:r>
+              <a:rPr spc="20" dirty="0"/>
+              <a:t>/15</a:t>
+            </a:r>
+          </a:p>
+        </p:txBody>
+      </p:sp>
+      <p:pic>
+        <p:nvPicPr>
+          <p:cNvPr id="3" name="Picture 2">
+            <a:extLst>
+              <a:ext uri="{FF2B5EF4-FFF2-40B4-BE49-F238E27FC236}">
+                <a16:creationId xmlns:a16="http://schemas.microsoft.com/office/drawing/2014/main" id="{1C845392-F743-984A-B7F1-7BB3DECADD47}"/>
+              </a:ext>
+            </a:extLst>
+          </p:cNvPr>
+          <p:cNvPicPr>
+            <a:picLocks noChangeAspect="1"/>
+          </p:cNvPicPr>
+          <p:nvPr/>
+        </p:nvPicPr>
+        <p:blipFill>
+          <a:blip r:embed="rId2"/>
+          <a:stretch>
+            <a:fillRect/>
+          </a:stretch>
+        </p:blipFill>
+        <p:spPr>
+          <a:xfrm>
+            <a:off x="755083" y="434975"/>
+            <a:ext cx="3099934" cy="2972539"/>
+          </a:xfrm>
+          <a:prstGeom prst="rect">
+            <a:avLst/>
+          </a:prstGeom>
+        </p:spPr>
+      </p:pic>
+    </p:spTree>
+    <p:extLst>
+      <p:ext uri="{BB962C8B-B14F-4D97-AF65-F5344CB8AC3E}">
+        <p14:creationId xmlns:p14="http://schemas.microsoft.com/office/powerpoint/2010/main" val="1249693750"/>
+      </p:ext>
+    </p:extLst>
+  </p:cSld>
+  <p:clrMapOvr>
+    <a:masterClrMapping/>
+  </p:clrMapOvr>
+  <p:transition>
+    <p:cut/>
+  </p:transition>
+</p:sld>
+</file>
+
+<file path=ppt/slides/slide14.xml><?xml version="1.0" encoding="utf-8"?>
+<p:sld xmlns:a="http://schemas.openxmlformats.org/drawingml/2006/main" xmlns:r="http://schemas.openxmlformats.org/officeDocument/2006/relationships" xmlns:p="http://schemas.openxmlformats.org/presentationml/2006/main">
+  <p:cSld>
+    <p:spTree>
+      <p:nvGrpSpPr>
+        <p:cNvPr id="1" name=""/>
+        <p:cNvGrpSpPr/>
+        <p:nvPr/>
+      </p:nvGrpSpPr>
+      <p:grpSpPr>
+        <a:xfrm>
+          <a:off x="0" y="0"/>
+          <a:ext cx="0" cy="0"/>
+          <a:chOff x="0" y="0"/>
+          <a:chExt cx="0" cy="0"/>
+        </a:xfrm>
+      </p:grpSpPr>
+      <p:sp>
+        <p:nvSpPr>
+          <p:cNvPr id="2" name="object 2"/>
+          <p:cNvSpPr txBox="1">
+            <a:spLocks noGrp="1"/>
+          </p:cNvSpPr>
+          <p:nvPr>
+            <p:ph type="title"/>
+          </p:nvPr>
+        </p:nvSpPr>
+        <p:spPr>
+          <a:xfrm>
+            <a:off x="275296" y="121180"/>
+            <a:ext cx="1877354" cy="232756"/>
+          </a:xfrm>
+          <a:prstGeom prst="rect">
+            <a:avLst/>
+          </a:prstGeom>
+        </p:spPr>
+        <p:txBody>
+          <a:bodyPr vert="horz" wrap="square" lIns="0" tIns="17145" rIns="0" bIns="0" rtlCol="0">
+            <a:spAutoFit/>
+          </a:bodyPr>
+          <a:lstStyle/>
+          <a:p>
+            <a:pPr marL="12700">
+              <a:lnSpc>
+                <a:spcPct val="100000"/>
+              </a:lnSpc>
+              <a:spcBef>
+                <a:spcPts val="135"/>
+              </a:spcBef>
+            </a:pPr>
+            <a:r>
+              <a:rPr lang="en-US" spc="-15" dirty="0"/>
+              <a:t>Results</a:t>
+            </a:r>
+            <a:endParaRPr spc="-15" dirty="0"/>
+          </a:p>
+        </p:txBody>
+      </p:sp>
+      <p:sp>
+        <p:nvSpPr>
+          <p:cNvPr id="6" name="object 6"/>
+          <p:cNvSpPr txBox="1">
+            <a:spLocks noGrp="1"/>
+          </p:cNvSpPr>
+          <p:nvPr>
+            <p:ph type="ftr" sz="quarter" idx="5"/>
+          </p:nvPr>
+        </p:nvSpPr>
+        <p:spPr>
+          <a:xfrm>
+            <a:off x="1716874" y="3204555"/>
+            <a:ext cx="978535" cy="114134"/>
+          </a:xfrm>
+          <a:prstGeom prst="rect">
+            <a:avLst/>
+          </a:prstGeom>
+        </p:spPr>
+        <p:txBody>
+          <a:bodyPr vert="horz" wrap="square" lIns="0" tIns="21590" rIns="0" bIns="0" rtlCol="0">
+            <a:spAutoFit/>
+          </a:bodyPr>
+          <a:lstStyle/>
+          <a:p>
+            <a:pPr marL="12700">
+              <a:lnSpc>
+                <a:spcPct val="100000"/>
+              </a:lnSpc>
+              <a:spcBef>
+                <a:spcPts val="170"/>
+              </a:spcBef>
+            </a:pPr>
+            <a:r>
+              <a:rPr spc="80" dirty="0"/>
+              <a:t>Stat </a:t>
+            </a:r>
+            <a:r>
+              <a:rPr lang="en-US" spc="65" dirty="0"/>
+              <a:t>795</a:t>
+            </a:r>
+            <a:r>
+              <a:rPr spc="55" dirty="0"/>
+              <a:t> Presentation</a:t>
+            </a:r>
+          </a:p>
+        </p:txBody>
+      </p:sp>
+      <p:sp>
+        <p:nvSpPr>
+          <p:cNvPr id="7" name="object 7"/>
+          <p:cNvSpPr txBox="1">
+            <a:spLocks noGrp="1"/>
+          </p:cNvSpPr>
+          <p:nvPr>
+            <p:ph type="sldNum" sz="quarter" idx="7"/>
+          </p:nvPr>
+        </p:nvSpPr>
+        <p:spPr>
+          <a:prstGeom prst="rect">
+            <a:avLst/>
+          </a:prstGeom>
+        </p:spPr>
+        <p:txBody>
+          <a:bodyPr vert="horz" wrap="square" lIns="0" tIns="18415" rIns="0" bIns="0" rtlCol="0">
+            <a:spAutoFit/>
+          </a:bodyPr>
+          <a:lstStyle/>
+          <a:p>
+            <a:pPr marL="25400">
+              <a:lnSpc>
+                <a:spcPct val="100000"/>
+              </a:lnSpc>
+              <a:spcBef>
+                <a:spcPts val="145"/>
+              </a:spcBef>
+            </a:pPr>
+            <a:fld id="{81D60167-4931-47E6-BA6A-407CBD079E47}" type="slidenum">
+              <a:rPr spc="20" dirty="0"/>
+              <a:t>14</a:t>
+            </a:fld>
+            <a:r>
+              <a:rPr spc="20" dirty="0"/>
+              <a:t>/15</a:t>
+            </a:r>
+          </a:p>
+        </p:txBody>
+      </p:sp>
+      <p:pic>
+        <p:nvPicPr>
+          <p:cNvPr id="8" name="Picture 7">
+            <a:extLst>
+              <a:ext uri="{FF2B5EF4-FFF2-40B4-BE49-F238E27FC236}">
+                <a16:creationId xmlns:a16="http://schemas.microsoft.com/office/drawing/2014/main" id="{C66F126F-B4D2-F44C-8729-46532F3B7F33}"/>
+              </a:ext>
+            </a:extLst>
+          </p:cNvPr>
+          <p:cNvPicPr>
+            <a:picLocks noChangeAspect="1"/>
+          </p:cNvPicPr>
+          <p:nvPr/>
+        </p:nvPicPr>
+        <p:blipFill>
+          <a:blip r:embed="rId2"/>
+          <a:stretch>
+            <a:fillRect/>
+          </a:stretch>
+        </p:blipFill>
+        <p:spPr>
+          <a:xfrm>
+            <a:off x="0" y="511176"/>
+            <a:ext cx="2305050" cy="897386"/>
+          </a:xfrm>
+          <a:prstGeom prst="rect">
+            <a:avLst/>
+          </a:prstGeom>
+        </p:spPr>
+      </p:pic>
+      <p:sp>
+        <p:nvSpPr>
+          <p:cNvPr id="9" name="object 2">
+            <a:extLst>
+              <a:ext uri="{FF2B5EF4-FFF2-40B4-BE49-F238E27FC236}">
+                <a16:creationId xmlns:a16="http://schemas.microsoft.com/office/drawing/2014/main" id="{3375309D-8B6F-954A-BC8A-B3B59D6E58C5}"/>
+              </a:ext>
+            </a:extLst>
+          </p:cNvPr>
+          <p:cNvSpPr txBox="1">
+            <a:spLocks/>
+          </p:cNvSpPr>
+          <p:nvPr/>
+        </p:nvSpPr>
+        <p:spPr>
+          <a:xfrm>
+            <a:off x="95250" y="1408562"/>
+            <a:ext cx="990600" cy="171201"/>
+          </a:xfrm>
+          <a:prstGeom prst="rect">
+            <a:avLst/>
+          </a:prstGeom>
+        </p:spPr>
+        <p:txBody>
+          <a:bodyPr vert="horz" wrap="square" lIns="0" tIns="17145" rIns="0" bIns="0" rtlCol="0">
+            <a:spAutoFit/>
+          </a:bodyPr>
+          <a:lstStyle>
+            <a:lvl1pPr>
+              <a:defRPr sz="1400" b="0" i="0">
+                <a:solidFill>
+                  <a:srgbClr val="58180C"/>
+                </a:solidFill>
+                <a:latin typeface="Palatino Linotype"/>
+                <a:ea typeface="+mj-ea"/>
+                <a:cs typeface="Palatino Linotype"/>
+              </a:defRPr>
+            </a:lvl1pPr>
+          </a:lstStyle>
+          <a:p>
+            <a:pPr marL="12700">
+              <a:spcBef>
+                <a:spcPts val="135"/>
+              </a:spcBef>
+            </a:pPr>
+            <a:r>
+              <a:rPr lang="en-US" sz="1000" kern="0" spc="-15" dirty="0"/>
+              <a:t>Carry Distance</a:t>
+            </a:r>
+          </a:p>
+        </p:txBody>
+      </p:sp>
+      <p:pic>
+        <p:nvPicPr>
+          <p:cNvPr id="4" name="Picture 3">
+            <a:extLst>
+              <a:ext uri="{FF2B5EF4-FFF2-40B4-BE49-F238E27FC236}">
+                <a16:creationId xmlns:a16="http://schemas.microsoft.com/office/drawing/2014/main" id="{7BBA5962-BA2B-0148-BA5F-77A5E36B39D2}"/>
+              </a:ext>
+            </a:extLst>
+          </p:cNvPr>
+          <p:cNvPicPr>
+            <a:picLocks noChangeAspect="1"/>
+          </p:cNvPicPr>
+          <p:nvPr/>
+        </p:nvPicPr>
+        <p:blipFill>
+          <a:blip r:embed="rId3"/>
+          <a:stretch>
+            <a:fillRect/>
+          </a:stretch>
+        </p:blipFill>
+        <p:spPr>
+          <a:xfrm>
+            <a:off x="0" y="1669223"/>
+            <a:ext cx="2305050" cy="924911"/>
+          </a:xfrm>
+          <a:prstGeom prst="rect">
+            <a:avLst/>
+          </a:prstGeom>
+        </p:spPr>
+      </p:pic>
+      <p:sp>
+        <p:nvSpPr>
+          <p:cNvPr id="10" name="object 2">
+            <a:extLst>
+              <a:ext uri="{FF2B5EF4-FFF2-40B4-BE49-F238E27FC236}">
+                <a16:creationId xmlns:a16="http://schemas.microsoft.com/office/drawing/2014/main" id="{BA156503-CA3D-9E47-ABAE-B50906872B40}"/>
+              </a:ext>
+            </a:extLst>
+          </p:cNvPr>
+          <p:cNvSpPr txBox="1">
+            <a:spLocks/>
+          </p:cNvSpPr>
+          <p:nvPr/>
+        </p:nvSpPr>
+        <p:spPr>
+          <a:xfrm>
+            <a:off x="95250" y="2603595"/>
+            <a:ext cx="990600" cy="171201"/>
+          </a:xfrm>
+          <a:prstGeom prst="rect">
+            <a:avLst/>
+          </a:prstGeom>
+        </p:spPr>
+        <p:txBody>
+          <a:bodyPr vert="horz" wrap="square" lIns="0" tIns="17145" rIns="0" bIns="0" rtlCol="0">
+            <a:spAutoFit/>
+          </a:bodyPr>
+          <a:lstStyle>
+            <a:lvl1pPr>
+              <a:defRPr sz="1400" b="0" i="0">
+                <a:solidFill>
+                  <a:srgbClr val="58180C"/>
+                </a:solidFill>
+                <a:latin typeface="Palatino Linotype"/>
+                <a:ea typeface="+mj-ea"/>
+                <a:cs typeface="Palatino Linotype"/>
+              </a:defRPr>
+            </a:lvl1pPr>
+          </a:lstStyle>
+          <a:p>
+            <a:pPr marL="12700">
+              <a:spcBef>
+                <a:spcPts val="135"/>
+              </a:spcBef>
+            </a:pPr>
+            <a:r>
+              <a:rPr lang="en-US" sz="1000" kern="0" spc="-15" dirty="0"/>
+              <a:t>Carry Dispersion</a:t>
+            </a:r>
+          </a:p>
+        </p:txBody>
+      </p:sp>
+      <p:pic>
+        <p:nvPicPr>
+          <p:cNvPr id="5" name="Picture 4">
+            <a:extLst>
+              <a:ext uri="{FF2B5EF4-FFF2-40B4-BE49-F238E27FC236}">
+                <a16:creationId xmlns:a16="http://schemas.microsoft.com/office/drawing/2014/main" id="{7EAF386D-1F2A-DC4A-BCF0-7B74A6AD2490}"/>
+              </a:ext>
+            </a:extLst>
+          </p:cNvPr>
+          <p:cNvPicPr>
+            <a:picLocks noChangeAspect="1"/>
+          </p:cNvPicPr>
+          <p:nvPr/>
+        </p:nvPicPr>
+        <p:blipFill>
+          <a:blip r:embed="rId4"/>
+          <a:stretch>
+            <a:fillRect/>
+          </a:stretch>
+        </p:blipFill>
+        <p:spPr>
+          <a:xfrm>
+            <a:off x="2300846" y="532999"/>
+            <a:ext cx="2309254" cy="875563"/>
+          </a:xfrm>
+          <a:prstGeom prst="rect">
+            <a:avLst/>
+          </a:prstGeom>
+        </p:spPr>
+      </p:pic>
+      <p:sp>
+        <p:nvSpPr>
+          <p:cNvPr id="11" name="object 2">
+            <a:extLst>
+              <a:ext uri="{FF2B5EF4-FFF2-40B4-BE49-F238E27FC236}">
+                <a16:creationId xmlns:a16="http://schemas.microsoft.com/office/drawing/2014/main" id="{4A3AC342-F55B-9646-982C-F32B623BFD9F}"/>
+              </a:ext>
+            </a:extLst>
+          </p:cNvPr>
+          <p:cNvSpPr txBox="1">
+            <a:spLocks/>
+          </p:cNvSpPr>
+          <p:nvPr/>
+        </p:nvSpPr>
+        <p:spPr>
+          <a:xfrm>
+            <a:off x="2300846" y="1428974"/>
+            <a:ext cx="990600" cy="171201"/>
+          </a:xfrm>
+          <a:prstGeom prst="rect">
+            <a:avLst/>
+          </a:prstGeom>
+        </p:spPr>
+        <p:txBody>
+          <a:bodyPr vert="horz" wrap="square" lIns="0" tIns="17145" rIns="0" bIns="0" rtlCol="0">
+            <a:spAutoFit/>
+          </a:bodyPr>
+          <a:lstStyle>
+            <a:lvl1pPr>
+              <a:defRPr sz="1400" b="0" i="0">
+                <a:solidFill>
+                  <a:srgbClr val="58180C"/>
+                </a:solidFill>
+                <a:latin typeface="Palatino Linotype"/>
+                <a:ea typeface="+mj-ea"/>
+                <a:cs typeface="Palatino Linotype"/>
+              </a:defRPr>
+            </a:lvl1pPr>
+          </a:lstStyle>
+          <a:p>
+            <a:pPr marL="12700">
+              <a:spcBef>
+                <a:spcPts val="135"/>
+              </a:spcBef>
+            </a:pPr>
+            <a:r>
+              <a:rPr lang="en-US" sz="1000" kern="0" spc="-15" dirty="0"/>
+              <a:t>Total Distance</a:t>
+            </a:r>
+          </a:p>
+        </p:txBody>
+      </p:sp>
+      <p:pic>
+        <p:nvPicPr>
+          <p:cNvPr id="12" name="Picture 11">
+            <a:extLst>
+              <a:ext uri="{FF2B5EF4-FFF2-40B4-BE49-F238E27FC236}">
+                <a16:creationId xmlns:a16="http://schemas.microsoft.com/office/drawing/2014/main" id="{E62E2FC6-3570-754B-B32A-38E03251F5B1}"/>
+              </a:ext>
+            </a:extLst>
+          </p:cNvPr>
+          <p:cNvPicPr>
+            <a:picLocks noChangeAspect="1"/>
+          </p:cNvPicPr>
+          <p:nvPr/>
+        </p:nvPicPr>
+        <p:blipFill>
+          <a:blip r:embed="rId5"/>
+          <a:stretch>
+            <a:fillRect/>
+          </a:stretch>
+        </p:blipFill>
+        <p:spPr>
+          <a:xfrm>
+            <a:off x="2300846" y="1687507"/>
+            <a:ext cx="2309254" cy="911357"/>
+          </a:xfrm>
+          <a:prstGeom prst="rect">
+            <a:avLst/>
+          </a:prstGeom>
+        </p:spPr>
+      </p:pic>
+      <p:sp>
+        <p:nvSpPr>
+          <p:cNvPr id="13" name="object 2">
+            <a:extLst>
+              <a:ext uri="{FF2B5EF4-FFF2-40B4-BE49-F238E27FC236}">
+                <a16:creationId xmlns:a16="http://schemas.microsoft.com/office/drawing/2014/main" id="{059F271A-875F-0B44-96A3-8E0E2A006B1A}"/>
+              </a:ext>
+            </a:extLst>
+          </p:cNvPr>
+          <p:cNvSpPr txBox="1">
+            <a:spLocks/>
+          </p:cNvSpPr>
+          <p:nvPr/>
+        </p:nvSpPr>
+        <p:spPr>
+          <a:xfrm>
+            <a:off x="2300846" y="2603595"/>
+            <a:ext cx="990600" cy="171201"/>
+          </a:xfrm>
+          <a:prstGeom prst="rect">
+            <a:avLst/>
+          </a:prstGeom>
+        </p:spPr>
+        <p:txBody>
+          <a:bodyPr vert="horz" wrap="square" lIns="0" tIns="17145" rIns="0" bIns="0" rtlCol="0">
+            <a:spAutoFit/>
+          </a:bodyPr>
+          <a:lstStyle>
+            <a:lvl1pPr>
+              <a:defRPr sz="1400" b="0" i="0">
+                <a:solidFill>
+                  <a:srgbClr val="58180C"/>
+                </a:solidFill>
+                <a:latin typeface="Palatino Linotype"/>
+                <a:ea typeface="+mj-ea"/>
+                <a:cs typeface="Palatino Linotype"/>
+              </a:defRPr>
+            </a:lvl1pPr>
+          </a:lstStyle>
+          <a:p>
+            <a:pPr marL="12700">
+              <a:spcBef>
+                <a:spcPts val="135"/>
+              </a:spcBef>
+            </a:pPr>
+            <a:r>
+              <a:rPr lang="en-US" sz="1000" kern="0" spc="-15" dirty="0"/>
+              <a:t>Total Dispersion</a:t>
+            </a:r>
+          </a:p>
+        </p:txBody>
+      </p:sp>
+    </p:spTree>
+    <p:extLst>
+      <p:ext uri="{BB962C8B-B14F-4D97-AF65-F5344CB8AC3E}">
+        <p14:creationId xmlns:p14="http://schemas.microsoft.com/office/powerpoint/2010/main" val="119026934"/>
+      </p:ext>
+    </p:extLst>
+  </p:cSld>
+  <p:clrMapOvr>
+    <a:masterClrMapping/>
+  </p:clrMapOvr>
+  <p:transition>
+    <p:cut/>
+  </p:transition>
+</p:sld>
+</file>
+
+<file path=ppt/slides/slide15.xml><?xml version="1.0" encoding="utf-8"?>
+<p:sld xmlns:a="http://schemas.openxmlformats.org/drawingml/2006/main" xmlns:r="http://schemas.openxmlformats.org/officeDocument/2006/relationships" xmlns:p="http://schemas.openxmlformats.org/presentationml/2006/main">
+  <p:cSld>
+    <p:spTree>
+      <p:nvGrpSpPr>
+        <p:cNvPr id="1" name=""/>
+        <p:cNvGrpSpPr/>
+        <p:nvPr/>
+      </p:nvGrpSpPr>
+      <p:grpSpPr>
+        <a:xfrm>
+          <a:off x="0" y="0"/>
+          <a:ext cx="0" cy="0"/>
+          <a:chOff x="0" y="0"/>
+          <a:chExt cx="0" cy="0"/>
+        </a:xfrm>
+      </p:grpSpPr>
+      <p:sp>
+        <p:nvSpPr>
+          <p:cNvPr id="2" name="object 2"/>
+          <p:cNvSpPr txBox="1">
+            <a:spLocks noGrp="1"/>
+          </p:cNvSpPr>
+          <p:nvPr>
+            <p:ph type="title"/>
+          </p:nvPr>
+        </p:nvSpPr>
+        <p:spPr>
+          <a:xfrm>
+            <a:off x="275296" y="121180"/>
+            <a:ext cx="1877354" cy="232756"/>
+          </a:xfrm>
+          <a:prstGeom prst="rect">
+            <a:avLst/>
+          </a:prstGeom>
+        </p:spPr>
+        <p:txBody>
+          <a:bodyPr vert="horz" wrap="square" lIns="0" tIns="17145" rIns="0" bIns="0" rtlCol="0">
+            <a:spAutoFit/>
+          </a:bodyPr>
+          <a:lstStyle/>
+          <a:p>
+            <a:pPr marL="12700">
+              <a:lnSpc>
+                <a:spcPct val="100000"/>
+              </a:lnSpc>
+              <a:spcBef>
+                <a:spcPts val="135"/>
+              </a:spcBef>
+            </a:pPr>
+            <a:r>
+              <a:rPr lang="en-US" spc="-15" dirty="0"/>
+              <a:t>Conclusion</a:t>
+            </a:r>
+            <a:endParaRPr spc="-15" dirty="0"/>
+          </a:p>
+        </p:txBody>
+      </p:sp>
+      <p:sp>
+        <p:nvSpPr>
+          <p:cNvPr id="3" name="object 3"/>
+          <p:cNvSpPr/>
+          <p:nvPr/>
+        </p:nvSpPr>
+        <p:spPr>
+          <a:xfrm>
+            <a:off x="315264" y="1004036"/>
+            <a:ext cx="3977640" cy="192405"/>
+          </a:xfrm>
+          <a:custGeom>
+            <a:avLst/>
+            <a:gdLst/>
+            <a:ahLst/>
+            <a:cxnLst/>
+            <a:rect l="l" t="t" r="r" b="b"/>
+            <a:pathLst>
+              <a:path w="3977640" h="192405">
+                <a:moveTo>
+                  <a:pt x="0" y="192036"/>
+                </a:moveTo>
+                <a:lnTo>
+                  <a:pt x="3977474" y="192036"/>
+                </a:lnTo>
+                <a:lnTo>
+                  <a:pt x="3977474" y="0"/>
+                </a:lnTo>
+                <a:lnTo>
+                  <a:pt x="0" y="0"/>
+                </a:lnTo>
+                <a:lnTo>
+                  <a:pt x="0" y="192036"/>
+                </a:lnTo>
+                <a:close/>
+              </a:path>
+            </a:pathLst>
+          </a:custGeom>
+          <a:solidFill>
+            <a:srgbClr val="DBE4E4"/>
+          </a:solidFill>
+        </p:spPr>
+        <p:txBody>
+          <a:bodyPr wrap="square" lIns="0" tIns="0" rIns="0" bIns="0" rtlCol="0"/>
+          <a:lstStyle/>
+          <a:p>
+            <a:endParaRPr dirty="0"/>
+          </a:p>
+        </p:txBody>
+      </p:sp>
+      <p:sp>
+        <p:nvSpPr>
+          <p:cNvPr id="4" name="object 4"/>
+          <p:cNvSpPr/>
+          <p:nvPr/>
+        </p:nvSpPr>
+        <p:spPr>
+          <a:xfrm>
+            <a:off x="315264" y="1196073"/>
+            <a:ext cx="3977640" cy="1982102"/>
+          </a:xfrm>
+          <a:custGeom>
+            <a:avLst/>
+            <a:gdLst/>
+            <a:ahLst/>
+            <a:cxnLst/>
+            <a:rect l="l" t="t" r="r" b="b"/>
+            <a:pathLst>
+              <a:path w="3977640" h="1104264">
+                <a:moveTo>
+                  <a:pt x="0" y="1104125"/>
+                </a:moveTo>
+                <a:lnTo>
+                  <a:pt x="3977474" y="1104125"/>
+                </a:lnTo>
+                <a:lnTo>
+                  <a:pt x="3977474" y="0"/>
+                </a:lnTo>
+                <a:lnTo>
+                  <a:pt x="0" y="0"/>
+                </a:lnTo>
+                <a:lnTo>
+                  <a:pt x="0" y="1104125"/>
+                </a:lnTo>
+                <a:close/>
+              </a:path>
+            </a:pathLst>
+          </a:custGeom>
+          <a:solidFill>
+            <a:srgbClr val="F7F2E5"/>
+          </a:solidFill>
+        </p:spPr>
+        <p:txBody>
+          <a:bodyPr wrap="square" lIns="0" tIns="0" rIns="0" bIns="0" rtlCol="0"/>
+          <a:lstStyle/>
+          <a:p>
+            <a:endParaRPr dirty="0"/>
+          </a:p>
+        </p:txBody>
+      </p:sp>
+      <p:sp>
+        <p:nvSpPr>
+          <p:cNvPr id="5" name="object 5"/>
+          <p:cNvSpPr txBox="1">
+            <a:spLocks noGrp="1"/>
+          </p:cNvSpPr>
+          <p:nvPr>
+            <p:ph type="body" idx="1"/>
+          </p:nvPr>
+        </p:nvSpPr>
+        <p:spPr>
+          <a:xfrm>
+            <a:off x="313227" y="1149025"/>
+            <a:ext cx="3968648" cy="1050288"/>
+          </a:xfrm>
+          <a:prstGeom prst="rect">
+            <a:avLst/>
+          </a:prstGeom>
+        </p:spPr>
+        <p:txBody>
+          <a:bodyPr vert="horz" wrap="square" lIns="0" tIns="62230" rIns="0" bIns="0" rtlCol="0">
+            <a:spAutoFit/>
+          </a:bodyPr>
+          <a:lstStyle/>
+          <a:p>
+            <a:pPr marL="210185" indent="-171450">
+              <a:lnSpc>
+                <a:spcPct val="100000"/>
+              </a:lnSpc>
+              <a:spcBef>
+                <a:spcPts val="490"/>
+              </a:spcBef>
+              <a:buFont typeface="Arial" panose="020B0604020202020204" pitchFamily="34" charset="0"/>
+              <a:buChar char="•"/>
+            </a:pPr>
+            <a:r>
+              <a:rPr lang="en-US" sz="1200" spc="-30" dirty="0">
+                <a:solidFill>
+                  <a:srgbClr val="58180C"/>
+                </a:solidFill>
+                <a:latin typeface="Palatino Linotype"/>
+              </a:rPr>
+              <a:t>Both measures of distance (carry and total) had treatment effects that were highly significant.</a:t>
+            </a:r>
+          </a:p>
+          <a:p>
+            <a:pPr marL="210185" indent="-171450">
+              <a:lnSpc>
+                <a:spcPct val="100000"/>
+              </a:lnSpc>
+              <a:spcBef>
+                <a:spcPts val="490"/>
+              </a:spcBef>
+              <a:buFont typeface="Arial" panose="020B0604020202020204" pitchFamily="34" charset="0"/>
+              <a:buChar char="•"/>
+            </a:pPr>
+            <a:r>
+              <a:rPr lang="en-US" spc="-30" dirty="0"/>
+              <a:t>Measures of dispersion depended on the blocks they were placed in. This indicates wind had a significant impact on dispersion more so than the ball type used. </a:t>
+            </a:r>
+            <a:endParaRPr lang="en-US" sz="1200" spc="-30" dirty="0">
+              <a:solidFill>
+                <a:srgbClr val="58180C"/>
+              </a:solidFill>
+              <a:latin typeface="Palatino Linotype"/>
+            </a:endParaRPr>
+          </a:p>
+        </p:txBody>
+      </p:sp>
+      <p:sp>
+        <p:nvSpPr>
+          <p:cNvPr id="6" name="object 6"/>
+          <p:cNvSpPr txBox="1">
+            <a:spLocks noGrp="1"/>
+          </p:cNvSpPr>
+          <p:nvPr>
+            <p:ph type="ftr" sz="quarter" idx="5"/>
+          </p:nvPr>
+        </p:nvSpPr>
+        <p:spPr>
+          <a:xfrm>
+            <a:off x="1716874" y="3204555"/>
+            <a:ext cx="978535" cy="114134"/>
+          </a:xfrm>
+          <a:prstGeom prst="rect">
+            <a:avLst/>
+          </a:prstGeom>
+        </p:spPr>
+        <p:txBody>
+          <a:bodyPr vert="horz" wrap="square" lIns="0" tIns="21590" rIns="0" bIns="0" rtlCol="0">
+            <a:spAutoFit/>
+          </a:bodyPr>
+          <a:lstStyle/>
+          <a:p>
+            <a:pPr marL="12700">
+              <a:lnSpc>
+                <a:spcPct val="100000"/>
+              </a:lnSpc>
+              <a:spcBef>
+                <a:spcPts val="170"/>
+              </a:spcBef>
+            </a:pPr>
+            <a:r>
+              <a:rPr spc="80" dirty="0"/>
+              <a:t>Stat </a:t>
+            </a:r>
+            <a:r>
+              <a:rPr lang="en-US" spc="65" dirty="0"/>
+              <a:t>795</a:t>
+            </a:r>
+            <a:r>
+              <a:rPr spc="55" dirty="0"/>
+              <a:t> Presentation</a:t>
+            </a:r>
+          </a:p>
+        </p:txBody>
+      </p:sp>
+      <p:sp>
+        <p:nvSpPr>
+          <p:cNvPr id="7" name="object 7"/>
+          <p:cNvSpPr txBox="1">
+            <a:spLocks noGrp="1"/>
+          </p:cNvSpPr>
+          <p:nvPr>
+            <p:ph type="sldNum" sz="quarter" idx="7"/>
+          </p:nvPr>
+        </p:nvSpPr>
+        <p:spPr>
+          <a:prstGeom prst="rect">
+            <a:avLst/>
+          </a:prstGeom>
+        </p:spPr>
+        <p:txBody>
+          <a:bodyPr vert="horz" wrap="square" lIns="0" tIns="18415" rIns="0" bIns="0" rtlCol="0">
+            <a:spAutoFit/>
+          </a:bodyPr>
+          <a:lstStyle/>
+          <a:p>
+            <a:pPr marL="25400">
+              <a:lnSpc>
+                <a:spcPct val="100000"/>
+              </a:lnSpc>
+              <a:spcBef>
+                <a:spcPts val="145"/>
+              </a:spcBef>
+            </a:pPr>
+            <a:fld id="{81D60167-4931-47E6-BA6A-407CBD079E47}" type="slidenum">
+              <a:rPr spc="20" dirty="0"/>
+              <a:t>15</a:t>
+            </a:fld>
+            <a:r>
+              <a:rPr spc="20" dirty="0"/>
+              <a:t>/15</a:t>
+            </a:r>
+          </a:p>
+        </p:txBody>
+      </p:sp>
+    </p:spTree>
+    <p:extLst>
+      <p:ext uri="{BB962C8B-B14F-4D97-AF65-F5344CB8AC3E}">
+        <p14:creationId xmlns:p14="http://schemas.microsoft.com/office/powerpoint/2010/main" val="943963141"/>
+      </p:ext>
+    </p:extLst>
   </p:cSld>
   <p:clrMapOvr>
     <a:masterClrMapping/>

</xml_diff>